<commit_message>
Perhaps the final commit before the finals?
</commit_message>
<xml_diff>
--- a/Documents/Greendel presentation/presentation_final_3_ViimeinenPalaute.pptx
+++ b/Documents/Greendel presentation/presentation_final_3_ViimeinenPalaute.pptx
@@ -491,7 +491,7 @@
       </p:grpSpPr>
       <p:sp>
         <p:nvSpPr>
-          <p:cNvPr id="2" name="Slide Image Placeholder 1"/>
+          <p:cNvPr id="2" name="Dian kuvan paikkamerkki 1"/>
           <p:cNvSpPr>
             <a:spLocks noGrp="1" noRot="1" noChangeAspect="1"/>
           </p:cNvSpPr>
@@ -503,7 +503,7 @@
       </p:sp>
       <p:sp>
         <p:nvSpPr>
-          <p:cNvPr id="3" name="Notes Placeholder 2"/>
+          <p:cNvPr id="3" name="Huomautusten paikkamerkki 2"/>
           <p:cNvSpPr>
             <a:spLocks noGrp="1"/>
           </p:cNvSpPr>
@@ -516,74 +516,13 @@
           <a:bodyPr/>
           <a:lstStyle/>
           <a:p>
-            <a:pPr lvl="1"/>
-            <a:r>
-              <a:rPr lang="en-US" dirty="0" err="1" smtClean="0">
-                <a:solidFill>
-                  <a:schemeClr val="bg1"/>
-                </a:solidFill>
-              </a:rPr>
-              <a:t>Kerää</a:t>
-            </a:r>
-            <a:r>
-              <a:rPr lang="en-US" dirty="0" smtClean="0">
-                <a:solidFill>
-                  <a:schemeClr val="bg1"/>
-                </a:solidFill>
-              </a:rPr>
-              <a:t> </a:t>
-            </a:r>
-            <a:r>
-              <a:rPr lang="en-US" dirty="0" err="1" smtClean="0">
-                <a:solidFill>
-                  <a:schemeClr val="bg1"/>
-                </a:solidFill>
-              </a:rPr>
-              <a:t>esitä</a:t>
-            </a:r>
-            <a:r>
-              <a:rPr lang="en-US" dirty="0" smtClean="0">
-                <a:solidFill>
-                  <a:schemeClr val="bg1"/>
-                </a:solidFill>
-              </a:rPr>
-              <a:t>/</a:t>
-            </a:r>
-            <a:r>
-              <a:rPr lang="en-US" dirty="0" err="1" smtClean="0">
-                <a:solidFill>
-                  <a:schemeClr val="bg1"/>
-                </a:solidFill>
-              </a:rPr>
-              <a:t>ymmärrä</a:t>
-            </a:r>
-            <a:r>
-              <a:rPr lang="en-US" dirty="0" smtClean="0">
-                <a:solidFill>
-                  <a:schemeClr val="bg1"/>
-                </a:solidFill>
-              </a:rPr>
-              <a:t> </a:t>
-            </a:r>
-            <a:r>
-              <a:rPr lang="en-US" dirty="0" err="1" smtClean="0">
-                <a:solidFill>
-                  <a:schemeClr val="bg1"/>
-                </a:solidFill>
-              </a:rPr>
-              <a:t>hallitse</a:t>
-            </a:r>
-            <a:endParaRPr lang="en-US" dirty="0" smtClean="0">
-              <a:solidFill>
-                <a:schemeClr val="bg1"/>
-              </a:solidFill>
-            </a:endParaRPr>
-          </a:p>
-        </p:txBody>
-      </p:sp>
-      <p:sp>
-        <p:nvSpPr>
-          <p:cNvPr id="4" name="Slide Number Placeholder 3"/>
+            <a:endParaRPr lang="fi-FI" dirty="0"/>
+          </a:p>
+        </p:txBody>
+      </p:sp>
+      <p:sp>
+        <p:nvSpPr>
+          <p:cNvPr id="4" name="Dian numeron paikkamerkki 3"/>
           <p:cNvSpPr>
             <a:spLocks noGrp="1"/>
           </p:cNvSpPr>
@@ -599,7 +538,7 @@
             <a:fld id="{E98B8960-CAFA-4148-BCEB-5ADCF657DA97}" type="slidenum">
               <a:rPr lang="en-US" smtClean="0"/>
               <a:pPr/>
-              <a:t>4</a:t>
+              <a:t>1</a:t>
             </a:fld>
             <a:endParaRPr lang="en-US"/>
           </a:p>
@@ -608,7 +547,7 @@
     </p:spTree>
     <p:extLst>
       <p:ext uri="{BB962C8B-B14F-4D97-AF65-F5344CB8AC3E}">
-        <p14:creationId xmlns:p14="http://schemas.microsoft.com/office/powerpoint/2010/main" val="3424592196"/>
+        <p14:creationId xmlns:p14="http://schemas.microsoft.com/office/powerpoint/2010/main" val="1086879183"/>
       </p:ext>
     </p:extLst>
   </p:cSld>
@@ -662,16 +601,22 @@
           <a:bodyPr/>
           <a:lstStyle/>
           <a:p>
-            <a:pPr marL="0" indent="0">
-              <a:buNone/>
-            </a:pPr>
+            <a:pPr lvl="1"/>
+            <a:r>
+              <a:rPr lang="en-US" dirty="0" err="1" smtClean="0">
+                <a:solidFill>
+                  <a:schemeClr val="bg1"/>
+                </a:solidFill>
+              </a:rPr>
+              <a:t>Kerää</a:t>
+            </a:r>
             <a:r>
               <a:rPr lang="en-US" dirty="0" smtClean="0">
                 <a:solidFill>
                   <a:schemeClr val="bg1"/>
                 </a:solidFill>
               </a:rPr>
-              <a:t>Features </a:t>
+              <a:t> </a:t>
             </a:r>
             <a:r>
               <a:rPr lang="en-US" dirty="0" err="1" smtClean="0">
@@ -679,7 +624,7 @@
                   <a:schemeClr val="bg1"/>
                 </a:solidFill>
               </a:rPr>
-              <a:t>yhdistettynä</a:t>
+              <a:t>esitä</a:t>
             </a:r>
             <a:r>
               <a:rPr lang="en-US" dirty="0" smtClean="0">
@@ -687,6 +632,22 @@
                   <a:schemeClr val="bg1"/>
                 </a:solidFill>
               </a:rPr>
+              <a:t>/</a:t>
+            </a:r>
+            <a:r>
+              <a:rPr lang="en-US" dirty="0" err="1" smtClean="0">
+                <a:solidFill>
+                  <a:schemeClr val="bg1"/>
+                </a:solidFill>
+              </a:rPr>
+              <a:t>ymmärrä</a:t>
+            </a:r>
+            <a:r>
+              <a:rPr lang="en-US" dirty="0" smtClean="0">
+                <a:solidFill>
+                  <a:schemeClr val="bg1"/>
+                </a:solidFill>
+              </a:rPr>
               <a:t> </a:t>
             </a:r>
             <a:r>
@@ -695,99 +656,13 @@
                   <a:schemeClr val="bg1"/>
                 </a:solidFill>
               </a:rPr>
-              <a:t>solutioniin</a:t>
-            </a:r>
-            <a:r>
-              <a:rPr lang="en-US" dirty="0" smtClean="0">
-                <a:solidFill>
-                  <a:schemeClr val="bg1"/>
-                </a:solidFill>
-              </a:rPr>
-              <a:t>?</a:t>
-            </a:r>
-          </a:p>
-          <a:p>
-            <a:pPr marL="0" indent="0">
-              <a:buNone/>
-            </a:pPr>
-            <a:r>
-              <a:rPr lang="en-US" dirty="0" smtClean="0">
-                <a:solidFill>
-                  <a:schemeClr val="bg1"/>
-                </a:solidFill>
-              </a:rPr>
-              <a:t>(4 </a:t>
-            </a:r>
-            <a:r>
-              <a:rPr lang="en-US" dirty="0" err="1" smtClean="0">
-                <a:solidFill>
-                  <a:schemeClr val="bg1"/>
-                </a:solidFill>
-              </a:rPr>
-              <a:t>eri</a:t>
-            </a:r>
-            <a:r>
-              <a:rPr lang="en-US" dirty="0" smtClean="0">
-                <a:solidFill>
-                  <a:schemeClr val="bg1"/>
-                </a:solidFill>
-              </a:rPr>
-              <a:t> </a:t>
-            </a:r>
-            <a:r>
-              <a:rPr lang="en-US" dirty="0" err="1" smtClean="0">
-                <a:solidFill>
-                  <a:schemeClr val="bg1"/>
-                </a:solidFill>
-              </a:rPr>
-              <a:t>ryhmää</a:t>
-            </a:r>
-            <a:r>
-              <a:rPr lang="en-US" dirty="0" smtClean="0">
-                <a:solidFill>
-                  <a:schemeClr val="bg1"/>
-                </a:solidFill>
-              </a:rPr>
-              <a:t>, </a:t>
-            </a:r>
-            <a:r>
-              <a:rPr lang="en-US" dirty="0" err="1" smtClean="0">
-                <a:solidFill>
-                  <a:schemeClr val="bg1"/>
-                </a:solidFill>
-              </a:rPr>
-              <a:t>lause</a:t>
-            </a:r>
-            <a:r>
-              <a:rPr lang="en-US" dirty="0" smtClean="0">
-                <a:solidFill>
-                  <a:schemeClr val="bg1"/>
-                </a:solidFill>
-              </a:rPr>
-              <a:t> </a:t>
-            </a:r>
-            <a:r>
-              <a:rPr lang="en-US" dirty="0" err="1" smtClean="0">
-                <a:solidFill>
-                  <a:schemeClr val="bg1"/>
-                </a:solidFill>
-              </a:rPr>
-              <a:t>jokaisesta</a:t>
-            </a:r>
-            <a:r>
-              <a:rPr lang="en-US" dirty="0" smtClean="0">
-                <a:solidFill>
-                  <a:schemeClr val="bg1"/>
-                </a:solidFill>
-              </a:rPr>
-              <a:t>)</a:t>
-            </a:r>
-          </a:p>
-          <a:p>
-            <a:endParaRPr lang="en-US" dirty="0" smtClean="0"/>
-          </a:p>
-          <a:p>
-            <a:endParaRPr lang="en-US" dirty="0"/>
+              <a:t>hallitse</a:t>
+            </a:r>
+            <a:endParaRPr lang="en-US" dirty="0" smtClean="0">
+              <a:solidFill>
+                <a:schemeClr val="bg1"/>
+              </a:solidFill>
+            </a:endParaRPr>
           </a:p>
         </p:txBody>
       </p:sp>
@@ -809,7 +684,7 @@
             <a:fld id="{E98B8960-CAFA-4148-BCEB-5ADCF657DA97}" type="slidenum">
               <a:rPr lang="en-US" smtClean="0"/>
               <a:pPr/>
-              <a:t>5</a:t>
+              <a:t>4</a:t>
             </a:fld>
             <a:endParaRPr lang="en-US"/>
           </a:p>
@@ -818,7 +693,7 @@
     </p:spTree>
     <p:extLst>
       <p:ext uri="{BB962C8B-B14F-4D97-AF65-F5344CB8AC3E}">
-        <p14:creationId xmlns:p14="http://schemas.microsoft.com/office/powerpoint/2010/main" val="2251729579"/>
+        <p14:creationId xmlns:p14="http://schemas.microsoft.com/office/powerpoint/2010/main" val="3424592196"/>
       </p:ext>
     </p:extLst>
   </p:cSld>
@@ -872,18 +747,131 @@
           <a:bodyPr/>
           <a:lstStyle/>
           <a:p>
-            <a:r>
-              <a:rPr lang="en-US" dirty="0" err="1" smtClean="0"/>
-              <a:t>Korjaa</a:t>
-            </a:r>
-            <a:r>
-              <a:rPr lang="en-US" dirty="0" smtClean="0"/>
+            <a:pPr marL="0" indent="0">
+              <a:buNone/>
+            </a:pPr>
+            <a:r>
+              <a:rPr lang="en-US" dirty="0" smtClean="0">
+                <a:solidFill>
+                  <a:schemeClr val="bg1"/>
+                </a:solidFill>
+              </a:rPr>
+              <a:t>Features </a:t>
+            </a:r>
+            <a:r>
+              <a:rPr lang="en-US" dirty="0" err="1" smtClean="0">
+                <a:solidFill>
+                  <a:schemeClr val="bg1"/>
+                </a:solidFill>
+              </a:rPr>
+              <a:t>yhdistettynä</a:t>
+            </a:r>
+            <a:r>
+              <a:rPr lang="en-US" dirty="0" smtClean="0">
+                <a:solidFill>
+                  <a:schemeClr val="bg1"/>
+                </a:solidFill>
+              </a:rPr>
               <a:t> </a:t>
             </a:r>
             <a:r>
-              <a:rPr lang="en-US" dirty="0" err="1" smtClean="0"/>
-              <a:t>kaavio</a:t>
-            </a:r>
+              <a:rPr lang="en-US" dirty="0" err="1" smtClean="0">
+                <a:solidFill>
+                  <a:schemeClr val="bg1"/>
+                </a:solidFill>
+              </a:rPr>
+              <a:t>solutioniin</a:t>
+            </a:r>
+            <a:r>
+              <a:rPr lang="en-US" dirty="0" smtClean="0">
+                <a:solidFill>
+                  <a:schemeClr val="bg1"/>
+                </a:solidFill>
+              </a:rPr>
+              <a:t>?</a:t>
+            </a:r>
+          </a:p>
+          <a:p>
+            <a:pPr marL="0" indent="0">
+              <a:buNone/>
+            </a:pPr>
+            <a:r>
+              <a:rPr lang="en-US" dirty="0" smtClean="0">
+                <a:solidFill>
+                  <a:schemeClr val="bg1"/>
+                </a:solidFill>
+              </a:rPr>
+              <a:t>(4 </a:t>
+            </a:r>
+            <a:r>
+              <a:rPr lang="en-US" dirty="0" err="1" smtClean="0">
+                <a:solidFill>
+                  <a:schemeClr val="bg1"/>
+                </a:solidFill>
+              </a:rPr>
+              <a:t>eri</a:t>
+            </a:r>
+            <a:r>
+              <a:rPr lang="en-US" dirty="0" smtClean="0">
+                <a:solidFill>
+                  <a:schemeClr val="bg1"/>
+                </a:solidFill>
+              </a:rPr>
+              <a:t> </a:t>
+            </a:r>
+            <a:r>
+              <a:rPr lang="en-US" dirty="0" err="1" smtClean="0">
+                <a:solidFill>
+                  <a:schemeClr val="bg1"/>
+                </a:solidFill>
+              </a:rPr>
+              <a:t>ryhmää</a:t>
+            </a:r>
+            <a:r>
+              <a:rPr lang="en-US" dirty="0" smtClean="0">
+                <a:solidFill>
+                  <a:schemeClr val="bg1"/>
+                </a:solidFill>
+              </a:rPr>
+              <a:t>, </a:t>
+            </a:r>
+            <a:r>
+              <a:rPr lang="en-US" dirty="0" err="1" smtClean="0">
+                <a:solidFill>
+                  <a:schemeClr val="bg1"/>
+                </a:solidFill>
+              </a:rPr>
+              <a:t>lause</a:t>
+            </a:r>
+            <a:r>
+              <a:rPr lang="en-US" dirty="0" smtClean="0">
+                <a:solidFill>
+                  <a:schemeClr val="bg1"/>
+                </a:solidFill>
+              </a:rPr>
+              <a:t> </a:t>
+            </a:r>
+            <a:r>
+              <a:rPr lang="en-US" dirty="0" err="1" smtClean="0">
+                <a:solidFill>
+                  <a:schemeClr val="bg1"/>
+                </a:solidFill>
+              </a:rPr>
+              <a:t>jokaisesta</a:t>
+            </a:r>
+            <a:r>
+              <a:rPr lang="en-US" dirty="0" smtClean="0">
+                <a:solidFill>
+                  <a:schemeClr val="bg1"/>
+                </a:solidFill>
+              </a:rPr>
+              <a:t>)</a:t>
+            </a:r>
+          </a:p>
+          <a:p>
+            <a:endParaRPr lang="en-US" dirty="0" smtClean="0"/>
+          </a:p>
+          <a:p>
             <a:endParaRPr lang="en-US" dirty="0"/>
           </a:p>
         </p:txBody>
@@ -906,7 +894,7 @@
             <a:fld id="{E98B8960-CAFA-4148-BCEB-5ADCF657DA97}" type="slidenum">
               <a:rPr lang="en-US" smtClean="0"/>
               <a:pPr/>
-              <a:t>6</a:t>
+              <a:t>5</a:t>
             </a:fld>
             <a:endParaRPr lang="en-US"/>
           </a:p>
@@ -915,7 +903,7 @@
     </p:spTree>
     <p:extLst>
       <p:ext uri="{BB962C8B-B14F-4D97-AF65-F5344CB8AC3E}">
-        <p14:creationId xmlns:p14="http://schemas.microsoft.com/office/powerpoint/2010/main" val="408599729"/>
+        <p14:creationId xmlns:p14="http://schemas.microsoft.com/office/powerpoint/2010/main" val="2251729579"/>
       </p:ext>
     </p:extLst>
   </p:cSld>
@@ -969,6 +957,103 @@
           <a:bodyPr/>
           <a:lstStyle/>
           <a:p>
+            <a:r>
+              <a:rPr lang="en-US" dirty="0" err="1" smtClean="0"/>
+              <a:t>Korjaa</a:t>
+            </a:r>
+            <a:r>
+              <a:rPr lang="en-US" dirty="0" smtClean="0"/>
+              <a:t> </a:t>
+            </a:r>
+            <a:r>
+              <a:rPr lang="en-US" dirty="0" err="1" smtClean="0"/>
+              <a:t>kaavio</a:t>
+            </a:r>
+            <a:endParaRPr lang="en-US" dirty="0"/>
+          </a:p>
+        </p:txBody>
+      </p:sp>
+      <p:sp>
+        <p:nvSpPr>
+          <p:cNvPr id="4" name="Slide Number Placeholder 3"/>
+          <p:cNvSpPr>
+            <a:spLocks noGrp="1"/>
+          </p:cNvSpPr>
+          <p:nvPr>
+            <p:ph type="sldNum" sz="quarter" idx="10"/>
+          </p:nvPr>
+        </p:nvSpPr>
+        <p:spPr/>
+        <p:txBody>
+          <a:bodyPr/>
+          <a:lstStyle/>
+          <a:p>
+            <a:fld id="{E98B8960-CAFA-4148-BCEB-5ADCF657DA97}" type="slidenum">
+              <a:rPr lang="en-US" smtClean="0"/>
+              <a:pPr/>
+              <a:t>6</a:t>
+            </a:fld>
+            <a:endParaRPr lang="en-US"/>
+          </a:p>
+        </p:txBody>
+      </p:sp>
+    </p:spTree>
+    <p:extLst>
+      <p:ext uri="{BB962C8B-B14F-4D97-AF65-F5344CB8AC3E}">
+        <p14:creationId xmlns:p14="http://schemas.microsoft.com/office/powerpoint/2010/main" val="408599729"/>
+      </p:ext>
+    </p:extLst>
+  </p:cSld>
+  <p:clrMapOvr>
+    <a:masterClrMapping/>
+  </p:clrMapOvr>
+</p:notes>
+</file>
+
+<file path=ppt/notesSlides/notesSlide5.xml><?xml version="1.0" encoding="utf-8"?>
+<p:notes xmlns:a="http://schemas.openxmlformats.org/drawingml/2006/main" xmlns:r="http://schemas.openxmlformats.org/officeDocument/2006/relationships" xmlns:p="http://schemas.openxmlformats.org/presentationml/2006/main">
+  <p:cSld>
+    <p:spTree>
+      <p:nvGrpSpPr>
+        <p:cNvPr id="1" name=""/>
+        <p:cNvGrpSpPr/>
+        <p:nvPr/>
+      </p:nvGrpSpPr>
+      <p:grpSpPr>
+        <a:xfrm>
+          <a:off x="0" y="0"/>
+          <a:ext cx="0" cy="0"/>
+          <a:chOff x="0" y="0"/>
+          <a:chExt cx="0" cy="0"/>
+        </a:xfrm>
+      </p:grpSpPr>
+      <p:sp>
+        <p:nvSpPr>
+          <p:cNvPr id="2" name="Slide Image Placeholder 1"/>
+          <p:cNvSpPr>
+            <a:spLocks noGrp="1" noRot="1" noChangeAspect="1"/>
+          </p:cNvSpPr>
+          <p:nvPr>
+            <p:ph type="sldImg"/>
+          </p:nvPr>
+        </p:nvSpPr>
+        <p:spPr/>
+      </p:sp>
+      <p:sp>
+        <p:nvSpPr>
+          <p:cNvPr id="3" name="Notes Placeholder 2"/>
+          <p:cNvSpPr>
+            <a:spLocks noGrp="1"/>
+          </p:cNvSpPr>
+          <p:nvPr>
+            <p:ph type="body" idx="1"/>
+          </p:nvPr>
+        </p:nvSpPr>
+        <p:spPr/>
+        <p:txBody>
+          <a:bodyPr/>
+          <a:lstStyle/>
+          <a:p>
             <a:pPr marL="0" marR="0" indent="0" algn="l" defTabSz="457200" rtl="0" eaLnBrk="1" fontAlgn="auto" latinLnBrk="0" hangingPunct="1">
               <a:lnSpc>
                 <a:spcPct val="100000"/>
@@ -988,11 +1073,7 @@
             </a:pPr>
             <a:r>
               <a:rPr lang="en-US" dirty="0" smtClean="0"/>
-              <a:t>VAATII </a:t>
-            </a:r>
-            <a:r>
-              <a:rPr lang="en-US" dirty="0" smtClean="0"/>
-              <a:t>HUOMIOTA  </a:t>
+              <a:t>VAATII HUOMIOTA  </a:t>
             </a:r>
           </a:p>
           <a:p>
@@ -1064,7 +1145,7 @@
 </p:notes>
 </file>
 
-<file path=ppt/notesSlides/notesSlide5.xml><?xml version="1.0" encoding="utf-8"?>
+<file path=ppt/notesSlides/notesSlide6.xml><?xml version="1.0" encoding="utf-8"?>
 <p:notes xmlns:a="http://schemas.openxmlformats.org/drawingml/2006/main" xmlns:r="http://schemas.openxmlformats.org/officeDocument/2006/relationships" xmlns:p="http://schemas.openxmlformats.org/presentationml/2006/main">
   <p:cSld>
     <p:spTree>
@@ -4551,7 +4632,7 @@
           <p:nvPr/>
         </p:nvPicPr>
         <p:blipFill rotWithShape="1">
-          <a:blip r:embed="rId2" cstate="print"/>
+          <a:blip r:embed="rId3" cstate="print"/>
           <a:srcRect l="62436" t="62562" r="31479" b="10026"/>
           <a:stretch/>
         </p:blipFill>
@@ -4574,7 +4655,7 @@
           <p:nvPr/>
         </p:nvPicPr>
         <p:blipFill rotWithShape="1">
-          <a:blip r:embed="rId3">
+          <a:blip r:embed="rId4">
             <a:extLst>
               <a:ext uri="{28A0092B-C50C-407E-A947-70E740481C1C}">
                 <a14:useLocalDpi xmlns:a14="http://schemas.microsoft.com/office/drawing/2010/main" val="0"/>
@@ -4740,8 +4821,8 @@
         </p:nvSpPr>
         <p:spPr>
           <a:xfrm>
-            <a:off x="899592" y="1124745"/>
-            <a:ext cx="6984776" cy="4824536"/>
+            <a:off x="899592" y="1052736"/>
+            <a:ext cx="6984776" cy="4896545"/>
           </a:xfrm>
         </p:spPr>
         <p:txBody>
@@ -4870,8 +4951,8 @@
         </p:nvSpPr>
         <p:spPr>
           <a:xfrm>
-            <a:off x="1043608" y="1196752"/>
-            <a:ext cx="6624736" cy="4245073"/>
+            <a:off x="1043608" y="1052736"/>
+            <a:ext cx="6624736" cy="4389089"/>
           </a:xfrm>
         </p:spPr>
         <p:txBody>
@@ -4894,11 +4975,6 @@
               </a:rPr>
               <a:t>Conclusion</a:t>
             </a:r>
-            <a:endParaRPr lang="en-US" sz="2400" dirty="0" smtClean="0">
-              <a:solidFill>
-                <a:srgbClr val="00CC00"/>
-              </a:solidFill>
-            </a:endParaRPr>
           </a:p>
           <a:p>
             <a:pPr>
@@ -4967,15 +5043,7 @@
                   <a:schemeClr val="bg1"/>
                 </a:solidFill>
               </a:rPr>
-              <a:t> is there to provide accurate data to a wide variety of </a:t>
-            </a:r>
-            <a:r>
-              <a:rPr lang="en-US" sz="1800" dirty="0" smtClean="0">
-                <a:solidFill>
-                  <a:schemeClr val="bg1"/>
-                </a:solidFill>
-              </a:rPr>
-              <a:t>users</a:t>
+              <a:t> is there to provide accurate data to a wide variety of users</a:t>
             </a:r>
           </a:p>
           <a:p>
@@ -5093,8 +5161,8 @@
         </p:nvSpPr>
         <p:spPr>
           <a:xfrm>
-            <a:off x="1043608" y="1200150"/>
-            <a:ext cx="6624736" cy="4317081"/>
+            <a:off x="1043608" y="1052736"/>
+            <a:ext cx="6624736" cy="4464495"/>
           </a:xfrm>
         </p:spPr>
         <p:txBody>
@@ -5132,11 +5200,6 @@
               </a:rPr>
               <a:t>Motivation</a:t>
             </a:r>
-            <a:endParaRPr lang="en-US" sz="1800" dirty="0" smtClean="0">
-              <a:solidFill>
-                <a:schemeClr val="bg1"/>
-              </a:solidFill>
-            </a:endParaRPr>
           </a:p>
           <a:p>
             <a:pPr>
@@ -5152,11 +5215,6 @@
               </a:rPr>
               <a:t>Vision</a:t>
             </a:r>
-            <a:endParaRPr lang="en-US" sz="1800" dirty="0" smtClean="0">
-              <a:solidFill>
-                <a:schemeClr val="bg1"/>
-              </a:solidFill>
-            </a:endParaRPr>
           </a:p>
           <a:p>
             <a:pPr>
@@ -5292,8 +5350,8 @@
         </p:nvSpPr>
         <p:spPr>
           <a:xfrm>
-            <a:off x="1043608" y="1200151"/>
-            <a:ext cx="6624736" cy="3957042"/>
+            <a:off x="1043608" y="1052736"/>
+            <a:ext cx="6624736" cy="4104457"/>
           </a:xfrm>
         </p:spPr>
         <p:txBody>
@@ -5342,15 +5400,7 @@
                   <a:schemeClr val="bg1"/>
                 </a:solidFill>
               </a:rPr>
-              <a:t>Energy prices will </a:t>
-            </a:r>
-            <a:r>
-              <a:rPr lang="en-US" sz="1800" dirty="0" smtClean="0">
-                <a:solidFill>
-                  <a:schemeClr val="bg1"/>
-                </a:solidFill>
-              </a:rPr>
-              <a:t>increase</a:t>
+              <a:t>Energy prices will increase</a:t>
             </a:r>
           </a:p>
           <a:p>
@@ -5378,21 +5428,8 @@
                   <a:schemeClr val="bg1"/>
                 </a:solidFill>
               </a:rPr>
-              <a:t>People will become more concerned about energy </a:t>
-            </a:r>
-            <a:r>
-              <a:rPr lang="en-US" sz="1800" dirty="0" smtClean="0">
-                <a:solidFill>
-                  <a:schemeClr val="bg1"/>
-                </a:solidFill>
-              </a:rPr>
-              <a:t>consumption and look for green alternatives</a:t>
-            </a:r>
-            <a:endParaRPr lang="en-US" sz="1800" dirty="0" smtClean="0">
-              <a:solidFill>
-                <a:schemeClr val="bg1"/>
-              </a:solidFill>
-            </a:endParaRPr>
+              <a:t>People will become more concerned about energy consumption and look for green alternatives</a:t>
+            </a:r>
           </a:p>
         </p:txBody>
       </p:sp>
@@ -5445,8 +5482,8 @@
         </p:nvSpPr>
         <p:spPr>
           <a:xfrm>
-            <a:off x="1043608" y="1200150"/>
-            <a:ext cx="6624736" cy="4317081"/>
+            <a:off x="1043608" y="1052736"/>
+            <a:ext cx="6624736" cy="4464495"/>
           </a:xfrm>
         </p:spPr>
         <p:txBody>
@@ -5469,11 +5506,6 @@
               </a:rPr>
               <a:t>Vision</a:t>
             </a:r>
-            <a:endParaRPr lang="en-US" sz="2400" dirty="0" smtClean="0">
-              <a:solidFill>
-                <a:srgbClr val="00CC00"/>
-              </a:solidFill>
-            </a:endParaRPr>
           </a:p>
           <a:p>
             <a:pPr>
@@ -5606,8 +5638,8 @@
         </p:nvSpPr>
         <p:spPr>
           <a:xfrm>
-            <a:off x="1043608" y="1200150"/>
-            <a:ext cx="6624736" cy="4317081"/>
+            <a:off x="1043608" y="1052736"/>
+            <a:ext cx="6624736" cy="4464495"/>
           </a:xfrm>
         </p:spPr>
         <p:txBody>
@@ -5727,16 +5759,7 @@
                 </a:solidFill>
                 <a:latin typeface="Segoe WP Semibold" pitchFamily="34" charset="0"/>
               </a:rPr>
-              <a:t>Access consumption </a:t>
-            </a:r>
-            <a:r>
-              <a:rPr lang="en-US" sz="1800" dirty="0" smtClean="0">
-                <a:solidFill>
-                  <a:schemeClr val="bg1"/>
-                </a:solidFill>
-                <a:latin typeface="Segoe WP Semibold" pitchFamily="34" charset="0"/>
-              </a:rPr>
-              <a:t>data in real time, globally</a:t>
+              <a:t>Access consumption data in real time, globally</a:t>
             </a:r>
           </a:p>
           <a:p>
@@ -7552,8 +7575,8 @@
         </p:nvSpPr>
         <p:spPr>
           <a:xfrm>
-            <a:off x="1043608" y="1200150"/>
-            <a:ext cx="6624736" cy="4245073"/>
+            <a:off x="1043608" y="1052736"/>
+            <a:ext cx="6624736" cy="4392487"/>
           </a:xfrm>
         </p:spPr>
         <p:txBody>
@@ -7711,15 +7734,7 @@
                   <a:schemeClr val="bg1"/>
                 </a:solidFill>
               </a:rPr>
-              <a:t>Windows Phone </a:t>
-            </a:r>
-            <a:r>
-              <a:rPr lang="en-US" sz="1800" dirty="0" smtClean="0">
-                <a:solidFill>
-                  <a:schemeClr val="bg1"/>
-                </a:solidFill>
-              </a:rPr>
-              <a:t>7 Client</a:t>
+              <a:t>Windows Phone 7 Client</a:t>
             </a:r>
           </a:p>
           <a:p>
@@ -7788,8 +7803,8 @@
         </p:nvSpPr>
         <p:spPr>
           <a:xfrm>
-            <a:off x="1043608" y="1200150"/>
-            <a:ext cx="6624736" cy="4317081"/>
+            <a:off x="1043608" y="1052736"/>
+            <a:ext cx="6624736" cy="4464495"/>
           </a:xfrm>
         </p:spPr>
         <p:txBody>
@@ -7893,15 +7908,7 @@
                   <a:schemeClr val="bg1"/>
                 </a:solidFill>
               </a:rPr>
-              <a:t>Small-scale renewable energy </a:t>
-            </a:r>
-            <a:r>
-              <a:rPr lang="en-US" sz="1800" dirty="0" smtClean="0">
-                <a:solidFill>
-                  <a:schemeClr val="bg1"/>
-                </a:solidFill>
-              </a:rPr>
-              <a:t>producers</a:t>
+              <a:t>Small-scale renewable energy producers</a:t>
             </a:r>
           </a:p>
           <a:p>
@@ -8014,8 +8021,8 @@
         </p:nvSpPr>
         <p:spPr>
           <a:xfrm>
-            <a:off x="1043608" y="1200150"/>
-            <a:ext cx="6624736" cy="4461098"/>
+            <a:off x="1043608" y="1052736"/>
+            <a:ext cx="6624736" cy="4608512"/>
           </a:xfrm>
         </p:spPr>
         <p:txBody>
@@ -8262,15 +8269,7 @@
                   <a:schemeClr val="bg1"/>
                 </a:solidFill>
               </a:rPr>
-              <a:t>  ~268</a:t>
-            </a:r>
-            <a:r>
-              <a:rPr lang="fi-FI" sz="1800" dirty="0" smtClean="0">
-                <a:solidFill>
-                  <a:schemeClr val="bg1"/>
-                </a:solidFill>
-              </a:rPr>
-              <a:t> 000</a:t>
+              <a:t>  ~268 000</a:t>
             </a:r>
             <a:r>
               <a:rPr lang="tr-TR" sz="1800" dirty="0" smtClean="0">
@@ -8298,21 +8297,8 @@
                   <a:schemeClr val="bg1"/>
                 </a:solidFill>
               </a:rPr>
-              <a:t>Devices: One-time fee of 120 € </a:t>
-            </a:r>
-            <a:r>
-              <a:rPr lang="en-US" sz="1800" dirty="0" smtClean="0">
-                <a:solidFill>
-                  <a:schemeClr val="bg1"/>
-                </a:solidFill>
-              </a:rPr>
-              <a:t>(basic model)</a:t>
-            </a:r>
-            <a:endParaRPr lang="en-US" sz="1800" dirty="0" smtClean="0">
-              <a:solidFill>
-                <a:schemeClr val="bg1"/>
-              </a:solidFill>
-            </a:endParaRPr>
+              <a:t>Devices: One-time fee of 120 € (basic model)</a:t>
+            </a:r>
           </a:p>
           <a:p>
             <a:pPr>
@@ -8381,31 +8367,7 @@
                   <a:schemeClr val="bg1"/>
                 </a:solidFill>
               </a:rPr>
-              <a:t>Subscription: </a:t>
-            </a:r>
-            <a:r>
-              <a:rPr lang="en-US" sz="1800" dirty="0" smtClean="0">
-                <a:solidFill>
-                  <a:schemeClr val="bg1"/>
-                </a:solidFill>
-              </a:rPr>
-              <a:t>36</a:t>
-            </a:r>
-            <a:r>
-              <a:rPr lang="en-US" sz="1800" dirty="0" smtClean="0">
-                <a:solidFill>
-                  <a:schemeClr val="bg1"/>
-                </a:solidFill>
-              </a:rPr>
-              <a:t> </a:t>
-            </a:r>
-            <a:r>
-              <a:rPr lang="en-US" sz="1800" dirty="0" smtClean="0">
-                <a:solidFill>
-                  <a:schemeClr val="bg1"/>
-                </a:solidFill>
-              </a:rPr>
-              <a:t>€ / year </a:t>
+              <a:t>Subscription: 36 € / year </a:t>
             </a:r>
             <a:r>
               <a:rPr lang="en-US" sz="1800" dirty="0">
@@ -8444,15 +8406,7 @@
                   <a:schemeClr val="bg1"/>
                 </a:solidFill>
               </a:rPr>
-              <a:t>(</a:t>
-            </a:r>
-            <a:r>
-              <a:rPr lang="en-US" sz="1800" dirty="0" err="1" smtClean="0">
-                <a:solidFill>
-                  <a:schemeClr val="bg1"/>
-                </a:solidFill>
-              </a:rPr>
-              <a:t>korjataan</a:t>
+              <a:t> 1 764 000 </a:t>
             </a:r>
             <a:r>
               <a:rPr lang="en-US" sz="1800" dirty="0" smtClean="0">
@@ -8460,15 +8414,7 @@
                   <a:schemeClr val="bg1"/>
                 </a:solidFill>
               </a:rPr>
-              <a:t>) 1 </a:t>
-            </a:r>
-            <a:r>
-              <a:rPr lang="en-US" sz="1800" dirty="0" smtClean="0">
-                <a:solidFill>
-                  <a:schemeClr val="bg1"/>
-                </a:solidFill>
-              </a:rPr>
-              <a:t>428 000 € / year in Finland</a:t>
+              <a:t>€ / year in Finland</a:t>
             </a:r>
             <a:endParaRPr lang="en-US" sz="1800" dirty="0">
               <a:solidFill>
@@ -8497,7 +8443,31 @@
                   <a:schemeClr val="bg1"/>
                 </a:solidFill>
               </a:rPr>
-              <a:t>                   8 060 220 € / year in California</a:t>
+              <a:t>                   </a:t>
+            </a:r>
+            <a:r>
+              <a:rPr lang="en-US" sz="1800" dirty="0" smtClean="0">
+                <a:solidFill>
+                  <a:schemeClr val="bg1"/>
+                </a:solidFill>
+              </a:rPr>
+              <a:t>9 642 000</a:t>
+            </a:r>
+            <a:r>
+              <a:rPr lang="en-US" sz="1800" dirty="0" smtClean="0">
+                <a:solidFill>
+                  <a:schemeClr val="bg1"/>
+                </a:solidFill>
+              </a:rPr>
+              <a:t> </a:t>
+            </a:r>
+            <a:r>
+              <a:rPr lang="en-US" sz="1800" dirty="0" smtClean="0">
+                <a:solidFill>
+                  <a:schemeClr val="bg1"/>
+                </a:solidFill>
+              </a:rPr>
+              <a:t>€ / year in California</a:t>
             </a:r>
           </a:p>
         </p:txBody>

</xml_diff>